<commit_message>
cleaning up file system
</commit_message>
<xml_diff>
--- a/materials_science_renderings/assets/handouts/03.03_fractional_coord.pptx
+++ b/materials_science_renderings/assets/handouts/03.03_fractional_coord.pptx
@@ -2,20 +2,20 @@
 <file path=ppt/presentation.xml><?xml version="1.0" encoding="utf-8"?>
 <p:presentation xmlns:a="http://schemas.openxmlformats.org/drawingml/2006/main" xmlns:r="http://schemas.openxmlformats.org/officeDocument/2006/relationships" xmlns:p="http://schemas.openxmlformats.org/presentationml/2006/main" saveSubsetFonts="1">
   <p:sldMasterIdLst>
-    <p:sldMasterId id="2147483648" r:id="rId3"/>
+    <p:sldMasterId id="2147483648" r:id="rId4"/>
   </p:sldMasterIdLst>
   <p:notesMasterIdLst>
-    <p:notesMasterId r:id="rId9"/>
+    <p:notesMasterId r:id="rId10"/>
   </p:notesMasterIdLst>
   <p:handoutMasterIdLst>
-    <p:handoutMasterId r:id="rId10"/>
+    <p:handoutMasterId r:id="rId11"/>
   </p:handoutMasterIdLst>
   <p:sldIdLst>
-    <p:sldId id="402" r:id="rId4"/>
-    <p:sldId id="410" r:id="rId5"/>
-    <p:sldId id="407" r:id="rId6"/>
-    <p:sldId id="409" r:id="rId7"/>
-    <p:sldId id="443" r:id="rId8"/>
+    <p:sldId id="402" r:id="rId5"/>
+    <p:sldId id="410" r:id="rId6"/>
+    <p:sldId id="407" r:id="rId7"/>
+    <p:sldId id="409" r:id="rId8"/>
+    <p:sldId id="443" r:id="rId9"/>
   </p:sldIdLst>
   <p:sldSz cx="9144000" cy="6858000" type="screen4x3"/>
   <p:notesSz cx="7010400" cy="9296400"/>
@@ -395,7 +395,7 @@
   <pc:docChgLst>
     <pc:chgData name="Corcoran, Sean" userId="3f12d0a3-3c97-4340-8007-c8fe7e07551f" providerId="ADAL" clId="{6919BBEC-BE23-464C-AA69-1E3396010B89}"/>
     <pc:docChg chg="addSld delSld modSld">
-      <pc:chgData name="Corcoran, Sean" userId="3f12d0a3-3c97-4340-8007-c8fe7e07551f" providerId="ADAL" clId="{6919BBEC-BE23-464C-AA69-1E3396010B89}" dt="2025-01-15T21:23:39.879" v="3" actId="47"/>
+      <pc:chgData name="Corcoran, Sean" userId="3f12d0a3-3c97-4340-8007-c8fe7e07551f" providerId="ADAL" clId="{6919BBEC-BE23-464C-AA69-1E3396010B89}" dt="2025-01-31T13:05:16.834" v="5" actId="14100"/>
       <pc:docMkLst>
         <pc:docMk/>
       </pc:docMkLst>
@@ -427,12 +427,20 @@
           <pc:sldMk cId="0" sldId="377"/>
         </pc:sldMkLst>
       </pc:sldChg>
-      <pc:sldChg chg="add">
-        <pc:chgData name="Corcoran, Sean" userId="3f12d0a3-3c97-4340-8007-c8fe7e07551f" providerId="ADAL" clId="{6919BBEC-BE23-464C-AA69-1E3396010B89}" dt="2025-01-15T21:18:06.526" v="0"/>
+      <pc:sldChg chg="modSp add mod">
+        <pc:chgData name="Corcoran, Sean" userId="3f12d0a3-3c97-4340-8007-c8fe7e07551f" providerId="ADAL" clId="{6919BBEC-BE23-464C-AA69-1E3396010B89}" dt="2025-01-31T13:05:16.834" v="5" actId="14100"/>
         <pc:sldMkLst>
           <pc:docMk/>
           <pc:sldMk cId="1516154214" sldId="402"/>
         </pc:sldMkLst>
+        <pc:picChg chg="mod">
+          <ac:chgData name="Corcoran, Sean" userId="3f12d0a3-3c97-4340-8007-c8fe7e07551f" providerId="ADAL" clId="{6919BBEC-BE23-464C-AA69-1E3396010B89}" dt="2025-01-31T13:05:16.834" v="5" actId="14100"/>
+          <ac:picMkLst>
+            <pc:docMk/>
+            <pc:sldMk cId="1516154214" sldId="402"/>
+            <ac:picMk id="242691" creationId="{00000000-0000-0000-0000-000000000000}"/>
+          </ac:picMkLst>
+        </pc:picChg>
       </pc:sldChg>
       <pc:sldChg chg="add">
         <pc:chgData name="Corcoran, Sean" userId="3f12d0a3-3c97-4340-8007-c8fe7e07551f" providerId="ADAL" clId="{6919BBEC-BE23-464C-AA69-1E3396010B89}" dt="2025-01-15T21:18:06.526" v="0"/>
@@ -606,7 +614,7 @@
             <a:fld id="{F797E30D-7844-4744-B251-12135FAE1C48}" type="datetimeFigureOut">
               <a:rPr lang="en-US" smtClean="0"/>
               <a:pPr/>
-              <a:t>1/15/2025</a:t>
+              <a:t>1/31/2025</a:t>
             </a:fld>
             <a:endParaRPr lang="en-US"/>
           </a:p>
@@ -773,7 +781,7 @@
             <a:fld id="{F94D73D4-B079-4AF1-87DE-E05EC7298882}" type="datetimeFigureOut">
               <a:rPr lang="en-US" smtClean="0"/>
               <a:pPr/>
-              <a:t>1/15/2025</a:t>
+              <a:t>1/31/2025</a:t>
             </a:fld>
             <a:endParaRPr lang="en-US"/>
           </a:p>
@@ -4607,8 +4615,8 @@
         </p:blipFill>
         <p:spPr bwMode="auto">
           <a:xfrm>
-            <a:off x="533400" y="2286000"/>
-            <a:ext cx="3429000" cy="3420894"/>
+            <a:off x="533400" y="990600"/>
+            <a:ext cx="4038600" cy="4716294"/>
           </a:xfrm>
           <a:prstGeom prst="rect">
             <a:avLst/>
@@ -6895,6 +6903,26 @@
 </file>
 
 <file path=customXml/item1.xml><?xml version="1.0" encoding="utf-8"?>
+<p:properties xmlns:p="http://schemas.microsoft.com/office/2006/metadata/properties" xmlns:xsi="http://www.w3.org/2001/XMLSchema-instance" xmlns:pc="http://schemas.microsoft.com/office/infopath/2007/PartnerControls">
+  <documentManagement>
+    <TaxCatchAll xmlns="0ffa7682-a752-4ec2-9b00-944c9a00bbe9" xsi:nil="true"/>
+    <lcf76f155ced4ddcb4097134ff3c332f xmlns="5bbddf2c-15bd-4cee-88ee-4bb358fdb5d4">
+      <Terms xmlns="http://schemas.microsoft.com/office/infopath/2007/PartnerControls"/>
+    </lcf76f155ced4ddcb4097134ff3c332f>
+  </documentManagement>
+</p:properties>
+</file>
+
+<file path=customXml/item2.xml><?xml version="1.0" encoding="utf-8"?>
+<?mso-contentType ?>
+<FormTemplates xmlns="http://schemas.microsoft.com/sharepoint/v3/contenttype/forms">
+  <Display>DocumentLibraryForm</Display>
+  <Edit>DocumentLibraryForm</Edit>
+  <New>DocumentLibraryForm</New>
+</FormTemplates>
+</file>
+
+<file path=customXml/item3.xml><?xml version="1.0" encoding="utf-8"?>
 <ct:contentTypeSchema xmlns:ct="http://schemas.microsoft.com/office/2006/metadata/contentType" xmlns:ma="http://schemas.microsoft.com/office/2006/metadata/properties/metaAttributes" ct:_="" ma:_="" ma:contentTypeName="Document" ma:contentTypeID="0x010100140A42B38915AC4EBAF791562DC92B4E" ma:contentTypeVersion="13" ma:contentTypeDescription="Create a new document." ma:contentTypeScope="" ma:versionID="45dcb3ee8ab16e94e9ce11f52f3ef1c8">
   <xsd:schema xmlns:xsd="http://www.w3.org/2001/XMLSchema" xmlns:xs="http://www.w3.org/2001/XMLSchema" xmlns:p="http://schemas.microsoft.com/office/2006/metadata/properties" xmlns:ns2="5bbddf2c-15bd-4cee-88ee-4bb358fdb5d4" xmlns:ns3="0ffa7682-a752-4ec2-9b00-944c9a00bbe9" targetNamespace="http://schemas.microsoft.com/office/2006/metadata/properties" ma:root="true" ma:fieldsID="ee4a90daa14cdc5725b57d2c9b788eb1" ns2:_="" ns3:_="">
     <xsd:import namespace="5bbddf2c-15bd-4cee-88ee-4bb358fdb5d4"/>
@@ -7101,28 +7129,15 @@
 </ct:contentTypeSchema>
 </file>
 
-<file path=customXml/item2.xml><?xml version="1.0" encoding="utf-8"?>
-<?mso-contentType ?>
-<FormTemplates xmlns="http://schemas.microsoft.com/sharepoint/v3/contenttype/forms">
-  <Display>DocumentLibraryForm</Display>
-  <Edit>DocumentLibraryForm</Edit>
-  <New>DocumentLibraryForm</New>
-</FormTemplates>
-</file>
-
-<file path=customXml/item3.xml><?xml version="1.0" encoding="utf-8"?>
-<p:properties xmlns:p="http://schemas.microsoft.com/office/2006/metadata/properties" xmlns:xsi="http://www.w3.org/2001/XMLSchema-instance" xmlns:pc="http://schemas.microsoft.com/office/infopath/2007/PartnerControls">
-  <documentManagement>
-    <TaxCatchAll xmlns="0ffa7682-a752-4ec2-9b00-944c9a00bbe9" xsi:nil="true"/>
-    <lcf76f155ced4ddcb4097134ff3c332f xmlns="5bbddf2c-15bd-4cee-88ee-4bb358fdb5d4">
-      <Terms xmlns="http://schemas.microsoft.com/office/infopath/2007/PartnerControls"/>
-    </lcf76f155ced4ddcb4097134ff3c332f>
-  </documentManagement>
-</p:properties>
-</file>
-
 <file path=customXml/itemProps1.xml><?xml version="1.0" encoding="utf-8"?>
-<ds:datastoreItem xmlns:ds="http://schemas.openxmlformats.org/officeDocument/2006/customXml" ds:itemID="{4E15D4B9-C803-4B91-878C-284FD3087B80}"/>
+<ds:datastoreItem xmlns:ds="http://schemas.openxmlformats.org/officeDocument/2006/customXml" ds:itemID="{A9C0F602-24EF-4B39-B8EA-6BB78456051B}">
+  <ds:schemaRefs>
+    <ds:schemaRef ds:uri="http://schemas.microsoft.com/office/2006/metadata/properties"/>
+    <ds:schemaRef ds:uri="http://schemas.microsoft.com/office/infopath/2007/PartnerControls"/>
+    <ds:schemaRef ds:uri="0ffa7682-a752-4ec2-9b00-944c9a00bbe9"/>
+    <ds:schemaRef ds:uri="5bbddf2c-15bd-4cee-88ee-4bb358fdb5d4"/>
+  </ds:schemaRefs>
+</ds:datastoreItem>
 </file>
 
 <file path=customXml/itemProps2.xml><?xml version="1.0" encoding="utf-8"?>
@@ -7134,5 +7149,20 @@
 </file>
 
 <file path=customXml/itemProps3.xml><?xml version="1.0" encoding="utf-8"?>
-<ds:datastoreItem xmlns:ds="http://schemas.openxmlformats.org/officeDocument/2006/customXml" ds:itemID="{A9C0F602-24EF-4B39-B8EA-6BB78456051B}"/>
+<ds:datastoreItem xmlns:ds="http://schemas.openxmlformats.org/officeDocument/2006/customXml" ds:itemID="{4E15D4B9-C803-4B91-878C-284FD3087B80}">
+  <ds:schemaRefs>
+    <ds:schemaRef ds:uri="http://schemas.microsoft.com/office/2006/metadata/contentType"/>
+    <ds:schemaRef ds:uri="http://schemas.microsoft.com/office/2006/metadata/properties/metaAttributes"/>
+    <ds:schemaRef ds:uri="http://www.w3.org/2001/XMLSchema"/>
+    <ds:schemaRef ds:uri="http://schemas.microsoft.com/office/2006/metadata/properties"/>
+    <ds:schemaRef ds:uri="5bbddf2c-15bd-4cee-88ee-4bb358fdb5d4"/>
+    <ds:schemaRef ds:uri="0ffa7682-a752-4ec2-9b00-944c9a00bbe9"/>
+    <ds:schemaRef ds:uri="http://schemas.microsoft.com/office/2006/documentManagement/types"/>
+    <ds:schemaRef ds:uri="http://schemas.microsoft.com/office/infopath/2007/PartnerControls"/>
+    <ds:schemaRef ds:uri="http://schemas.openxmlformats.org/package/2006/metadata/core-properties"/>
+    <ds:schemaRef ds:uri="http://purl.org/dc/elements/1.1/"/>
+    <ds:schemaRef ds:uri="http://purl.org/dc/terms/"/>
+    <ds:schemaRef ds:uri="http://schemas.microsoft.com/internal/obd"/>
+  </ds:schemaRefs>
+</ds:datastoreItem>
 </file>
</xml_diff>